<commit_message>
added model visualization to final presentation
</commit_message>
<xml_diff>
--- a/docs/Final_Presentation_25_01.pptx
+++ b/docs/Final_Presentation_25_01.pptx
@@ -308,7 +308,7 @@
           <a:p>
             <a:fld id="{FAE064D6-93C3-44CF-88EF-CDDC6F83E222}" type="datetimeFigureOut">
               <a:rPr lang="en-US"/>
-              <a:t>1/21/2022</a:t>
+              <a:t>1/22/2022</a:t>
             </a:fld>
             <a:endParaRPr lang="en-US"/>
           </a:p>
@@ -19903,10 +19903,10 @@
       </p:sp>
       <p:pic>
         <p:nvPicPr>
-          <p:cNvPr id="11" name="Graphic 10">
+          <p:cNvPr id="3" name="Picture 2">
             <a:extLst>
               <a:ext uri="{FF2B5EF4-FFF2-40B4-BE49-F238E27FC236}">
-                <a16:creationId xmlns:a16="http://schemas.microsoft.com/office/drawing/2014/main" id="{83E9806E-3D12-4DA7-88CA-8A87E40B8320}"/>
+                <a16:creationId xmlns:a16="http://schemas.microsoft.com/office/drawing/2014/main" id="{A8FAFC1B-8AFB-476E-A561-061D2F8BDAD1}"/>
               </a:ext>
             </a:extLst>
           </p:cNvPr>
@@ -19921,9 +19921,6 @@
               <a:ext uri="{28A0092B-C50C-407E-A947-70E740481C1C}">
                 <a14:useLocalDpi xmlns:a14="http://schemas.microsoft.com/office/drawing/2010/main" val="0"/>
               </a:ext>
-              <a:ext uri="{96DAC541-7B7A-43D3-8B79-37D633B846F1}">
-                <asvg:svgBlip xmlns:asvg="http://schemas.microsoft.com/office/drawing/2016/SVG/main" r:embed="rId4"/>
-              </a:ext>
             </a:extLst>
           </a:blip>
           <a:stretch>
@@ -19932,8 +19929,8 @@
         </p:blipFill>
         <p:spPr>
           <a:xfrm>
-            <a:off x="0" y="3183488"/>
-            <a:ext cx="12192000" cy="491023"/>
+            <a:off x="1352550" y="2462213"/>
+            <a:ext cx="9486900" cy="3714750"/>
           </a:xfrm>
           <a:prstGeom prst="rect">
             <a:avLst/>
@@ -20094,10 +20091,10 @@
       </p:sp>
       <p:pic>
         <p:nvPicPr>
-          <p:cNvPr id="3" name="Graphic 2">
+          <p:cNvPr id="6" name="Picture 5">
             <a:extLst>
               <a:ext uri="{FF2B5EF4-FFF2-40B4-BE49-F238E27FC236}">
-                <a16:creationId xmlns:a16="http://schemas.microsoft.com/office/drawing/2014/main" id="{88D366F1-2EDE-40E4-BE62-2C4714E494CE}"/>
+                <a16:creationId xmlns:a16="http://schemas.microsoft.com/office/drawing/2014/main" id="{37883536-97CB-44F1-9B47-39454704313E}"/>
               </a:ext>
             </a:extLst>
           </p:cNvPr>
@@ -20107,13 +20104,10 @@
           <p:nvPr/>
         </p:nvPicPr>
         <p:blipFill>
-          <a:blip r:embed="rId3" cstate="print">
+          <a:blip r:embed="rId3">
             <a:extLst>
               <a:ext uri="{28A0092B-C50C-407E-A947-70E740481C1C}">
                 <a14:useLocalDpi xmlns:a14="http://schemas.microsoft.com/office/drawing/2010/main" val="0"/>
-              </a:ext>
-              <a:ext uri="{96DAC541-7B7A-43D3-8B79-37D633B846F1}">
-                <asvg:svgBlip xmlns:asvg="http://schemas.microsoft.com/office/drawing/2016/SVG/main" r:embed="rId4"/>
               </a:ext>
             </a:extLst>
           </a:blip>
@@ -20123,8 +20117,8 @@
         </p:blipFill>
         <p:spPr>
           <a:xfrm>
-            <a:off x="0" y="3278363"/>
-            <a:ext cx="12192000" cy="301274"/>
+            <a:off x="0" y="2612675"/>
+            <a:ext cx="12192000" cy="3276968"/>
           </a:xfrm>
           <a:prstGeom prst="rect">
             <a:avLst/>

</xml_diff>